<commit_message>
Update Generating music with LSTM.pptx
</commit_message>
<xml_diff>
--- a/Generating music with LSTM.pptx
+++ b/Generating music with LSTM.pptx
@@ -5,7 +5,7 @@
     <p:sldMasterId id="2147483826" r:id="rId1"/>
   </p:sldMasterIdLst>
   <p:notesMasterIdLst>
-    <p:notesMasterId r:id="rId29"/>
+    <p:notesMasterId r:id="rId28"/>
   </p:notesMasterIdLst>
   <p:sldIdLst>
     <p:sldId id="256" r:id="rId2"/>
@@ -31,10 +31,9 @@
     <p:sldId id="280" r:id="rId22"/>
     <p:sldId id="282" r:id="rId23"/>
     <p:sldId id="281" r:id="rId24"/>
-    <p:sldId id="264" r:id="rId25"/>
-    <p:sldId id="293" r:id="rId26"/>
-    <p:sldId id="271" r:id="rId27"/>
-    <p:sldId id="261" r:id="rId28"/>
+    <p:sldId id="293" r:id="rId25"/>
+    <p:sldId id="271" r:id="rId26"/>
+    <p:sldId id="261" r:id="rId27"/>
   </p:sldIdLst>
   <p:sldSz cx="12192000" cy="6858000"/>
   <p:notesSz cx="6858000" cy="9144000"/>
@@ -768,7 +767,7 @@
           <a:p>
             <a:fld id="{081DE3EE-3CDA-46C4-9ADF-24A30FED5185}" type="slidenum">
               <a:rPr lang="en-US" smtClean="0"/>
-              <a:t>26</a:t>
+              <a:t>25</a:t>
             </a:fld>
             <a:endParaRPr lang="en-US"/>
           </a:p>
@@ -832,25 +831,10 @@
           <a:lstStyle/>
           <a:p>
             <a:r>
-              <a:rPr lang="en-US" dirty="0" smtClean="0"/>
-              <a:t>Make</a:t>
-            </a:r>
-            <a:r>
               <a:rPr lang="en-US" baseline="0" dirty="0" smtClean="0"/>
-              <a:t> dictionary of where keys = notes and value = numerical value that represents the key</a:t>
-            </a:r>
-          </a:p>
-          <a:p>
-            <a:r>
-              <a:rPr lang="en-US" baseline="0" dirty="0" smtClean="0"/>
-              <a:t>Sequence = 100 because instruments are relatively repetitive (for queen and Beethoven) (enough/ lack of domain knowledge)</a:t>
-            </a:r>
-          </a:p>
-          <a:p>
-            <a:r>
-              <a:rPr lang="en-US" baseline="0" dirty="0" smtClean="0"/>
-              <a:t>Normalize input, and one-hot encode output</a:t>
-            </a:r>
+              <a:t>10 epochs was not enough to identify significant patterns within the sequences of notes</a:t>
+            </a:r>
+            <a:endParaRPr lang="en-US" baseline="0" dirty="0" smtClean="0"/>
           </a:p>
           <a:p>
             <a:endParaRPr lang="en-US" baseline="0" dirty="0" smtClean="0"/>
@@ -939,24 +923,13 @@
           <a:p>
             <a:r>
               <a:rPr lang="en-US" dirty="0" smtClean="0"/>
-              <a:t>Make</a:t>
+              <a:t>There are</a:t>
             </a:r>
             <a:r>
               <a:rPr lang="en-US" baseline="0" dirty="0" smtClean="0"/>
-              <a:t> dictionary of where keys = notes and value = numerical value that represents the key</a:t>
-            </a:r>
-          </a:p>
-          <a:p>
-            <a:r>
-              <a:rPr lang="en-US" baseline="0" dirty="0" smtClean="0"/>
-              <a:t>Sequence = 100 because instruments are relatively repetitive (for queen and Beethoven) (enough/ lack of domain knowledge)</a:t>
-            </a:r>
-          </a:p>
-          <a:p>
-            <a:r>
-              <a:rPr lang="en-US" baseline="0" dirty="0" smtClean="0"/>
-              <a:t>Normalize input, and one-hot encode output</a:t>
-            </a:r>
+              <a:t> other notes in this, but it will eventually get stuck when it reaches a very unusual note</a:t>
+            </a:r>
+            <a:endParaRPr lang="en-US" baseline="0" dirty="0" smtClean="0"/>
           </a:p>
           <a:p>
             <a:endParaRPr lang="en-US" baseline="0" dirty="0" smtClean="0"/>
@@ -1044,27 +1017,15 @@
           <a:lstStyle/>
           <a:p>
             <a:r>
-              <a:rPr lang="en-US" dirty="0" smtClean="0"/>
-              <a:t>Make</a:t>
-            </a:r>
-            <a:r>
               <a:rPr lang="en-US" baseline="0" dirty="0" smtClean="0"/>
-              <a:t> dictionary of where keys = notes and value = numerical value that represents the key</a:t>
+              <a:t>Able to create a comprehensive sequence of notes</a:t>
             </a:r>
           </a:p>
           <a:p>
             <a:r>
               <a:rPr lang="en-US" baseline="0" dirty="0" smtClean="0"/>
-              <a:t>Sequence = 100 because instruments are relatively repetitive (for queen and Beethoven) (enough/ lack of domain knowledge)</a:t>
-            </a:r>
-          </a:p>
-          <a:p>
-            <a:r>
-              <a:rPr lang="en-US" baseline="0" dirty="0" smtClean="0"/>
-              <a:t>Normalize input, and one-hot encode output</a:t>
-            </a:r>
-          </a:p>
-          <a:p>
+              <a:t>Because it was looking at the vector of all the instruments combined, the result is interpreted as an acoustic/piano version of a song</a:t>
+            </a:r>
             <a:endParaRPr lang="en-US" baseline="0" dirty="0" smtClean="0"/>
           </a:p>
         </p:txBody>
@@ -1149,6 +1110,28 @@
           <a:bodyPr/>
           <a:lstStyle/>
           <a:p>
+            <a:r>
+              <a:rPr lang="en-US" dirty="0" smtClean="0"/>
+              <a:t>More simplistic/</a:t>
+            </a:r>
+            <a:r>
+              <a:rPr lang="en-US" baseline="0" dirty="0" smtClean="0"/>
+              <a:t> </a:t>
+            </a:r>
+            <a:r>
+              <a:rPr lang="en-US" baseline="0" dirty="0" err="1" smtClean="0"/>
+              <a:t>uni</a:t>
+            </a:r>
+            <a:r>
+              <a:rPr lang="en-US" baseline="0" dirty="0" smtClean="0"/>
+              <a:t>- dimensional data</a:t>
+            </a:r>
+          </a:p>
+          <a:p>
+            <a:r>
+              <a:rPr lang="en-US" baseline="0" dirty="0" smtClean="0"/>
+              <a:t>Theme of music is the same, and the role of piano did not change</a:t>
+            </a:r>
             <a:endParaRPr lang="en-US" dirty="0"/>
           </a:p>
         </p:txBody>
@@ -1235,24 +1218,9 @@
           <a:p>
             <a:r>
               <a:rPr lang="en-US" dirty="0" smtClean="0"/>
-              <a:t>Make</a:t>
-            </a:r>
-            <a:r>
-              <a:rPr lang="en-US" baseline="0" dirty="0" smtClean="0"/>
-              <a:t> dictionary of where keys = notes and value = numerical value that represents the key</a:t>
-            </a:r>
-          </a:p>
-          <a:p>
-            <a:r>
-              <a:rPr lang="en-US" baseline="0" dirty="0" smtClean="0"/>
-              <a:t>Sequence = 100 because instruments are relatively repetitive (for queen and Beethoven) (enough/ lack of domain knowledge)</a:t>
-            </a:r>
-          </a:p>
-          <a:p>
-            <a:r>
-              <a:rPr lang="en-US" baseline="0" dirty="0" smtClean="0"/>
-              <a:t>Normalize input, and one-hot encode output</a:t>
-            </a:r>
+              <a:t>Sounded a bit mysterious, dark, almost unnatural</a:t>
+            </a:r>
+            <a:endParaRPr lang="en-US" baseline="0" dirty="0" smtClean="0"/>
           </a:p>
           <a:p>
             <a:endParaRPr lang="en-US" baseline="0" dirty="0" smtClean="0"/>
@@ -1341,24 +1309,19 @@
           <a:p>
             <a:r>
               <a:rPr lang="en-US" dirty="0" smtClean="0"/>
-              <a:t>Make</a:t>
+              <a:t>More epochs,</a:t>
             </a:r>
             <a:r>
               <a:rPr lang="en-US" baseline="0" dirty="0" smtClean="0"/>
-              <a:t> dictionary of where keys = notes and value = numerical value that represents the key</a:t>
+              <a:t> more comprehensive</a:t>
             </a:r>
           </a:p>
           <a:p>
             <a:r>
               <a:rPr lang="en-US" baseline="0" dirty="0" smtClean="0"/>
-              <a:t>Sequence = 100 because instruments are relatively repetitive (for queen and Beethoven) (enough/ lack of domain knowledge)</a:t>
-            </a:r>
-          </a:p>
-          <a:p>
-            <a:r>
-              <a:rPr lang="en-US" baseline="0" dirty="0" smtClean="0"/>
-              <a:t>Normalize input, and one-hot encode output</a:t>
-            </a:r>
+              <a:t>When sped up, it seems like the notes are unified and sounded like a Beethoven song</a:t>
+            </a:r>
+            <a:endParaRPr lang="en-US" baseline="0" dirty="0" smtClean="0"/>
           </a:p>
           <a:p>
             <a:endParaRPr lang="en-US" baseline="0" dirty="0" smtClean="0"/>
@@ -4954,10 +4917,10 @@
           <p:cNvPr id="10" name="Rectangle 9">
             <a:extLst>
               <a:ext uri="{FF2B5EF4-FFF2-40B4-BE49-F238E27FC236}">
-                <a16:creationId xmlns:a16="http://schemas.microsoft.com/office/drawing/2014/main" xmlns="" id="{0864E5C9-52C9-4572-AC75-548B9B9C2648}"/>
+                <a16:creationId xmlns="" xmlns:a16="http://schemas.microsoft.com/office/drawing/2014/main" id="{0864E5C9-52C9-4572-AC75-548B9B9C2648}"/>
               </a:ext>
               <a:ext uri="{C183D7F6-B498-43B3-948B-1728B52AA6E4}">
-                <adec:decorative xmlns:adec="http://schemas.microsoft.com/office/drawing/2017/decorative" xmlns="" val="1"/>
+                <adec:decorative xmlns="" xmlns:adec="http://schemas.microsoft.com/office/drawing/2017/decorative" val="1"/>
               </a:ext>
             </a:extLst>
           </p:cNvPr>
@@ -4967,7 +4930,7 @@
           <p:nvPr>
             <p:extLst>
               <p:ext uri="{386F3935-93C4-4BCD-93E2-E3B085C9AB24}">
-                <p16:designElem xmlns:p16="http://schemas.microsoft.com/office/powerpoint/2015/main" xmlns="" val="1"/>
+                <p16:designElem xmlns="" xmlns:p16="http://schemas.microsoft.com/office/powerpoint/2015/main" val="1"/>
               </p:ext>
             </p:extLst>
           </p:nvPr>
@@ -5014,10 +4977,10 @@
           <p:cNvPr id="12" name="Rectangle 11">
             <a:extLst>
               <a:ext uri="{FF2B5EF4-FFF2-40B4-BE49-F238E27FC236}">
-                <a16:creationId xmlns:a16="http://schemas.microsoft.com/office/drawing/2014/main" xmlns="" id="{45CC6500-4DBD-4C34-BC14-2387FB483BEB}"/>
+                <a16:creationId xmlns="" xmlns:a16="http://schemas.microsoft.com/office/drawing/2014/main" id="{45CC6500-4DBD-4C34-BC14-2387FB483BEB}"/>
               </a:ext>
               <a:ext uri="{C183D7F6-B498-43B3-948B-1728B52AA6E4}">
-                <adec:decorative xmlns:adec="http://schemas.microsoft.com/office/drawing/2017/decorative" xmlns="" val="1"/>
+                <adec:decorative xmlns="" xmlns:adec="http://schemas.microsoft.com/office/drawing/2017/decorative" val="1"/>
               </a:ext>
             </a:extLst>
           </p:cNvPr>
@@ -5027,7 +4990,7 @@
           <p:nvPr>
             <p:extLst>
               <p:ext uri="{386F3935-93C4-4BCD-93E2-E3B085C9AB24}">
-                <p16:designElem xmlns:p16="http://schemas.microsoft.com/office/powerpoint/2015/main" xmlns="" val="1"/>
+                <p16:designElem xmlns="" xmlns:p16="http://schemas.microsoft.com/office/powerpoint/2015/main" val="1"/>
               </p:ext>
             </p:extLst>
           </p:nvPr>
@@ -5069,7 +5032,7 @@
           <p:cNvPr id="2" name="Title 1">
             <a:extLst>
               <a:ext uri="{FF2B5EF4-FFF2-40B4-BE49-F238E27FC236}">
-                <a16:creationId xmlns:a16="http://schemas.microsoft.com/office/drawing/2014/main" xmlns="" id="{BCBF419A-307A-4BCD-8DB0-C36BB1690C6B}"/>
+                <a16:creationId xmlns="" xmlns:a16="http://schemas.microsoft.com/office/drawing/2014/main" id="{BCBF419A-307A-4BCD-8DB0-C36BB1690C6B}"/>
               </a:ext>
             </a:extLst>
           </p:cNvPr>
@@ -5097,7 +5060,21 @@
                 <a:latin typeface="Calibri" panose="020F0502020204030204" pitchFamily="34" charset="0"/>
                 <a:cs typeface="Calibri" panose="020F0502020204030204" pitchFamily="34" charset="0"/>
               </a:rPr>
-              <a:t>Generating music </a:t>
+              <a:t>Generating </a:t>
+            </a:r>
+            <a:r>
+              <a:rPr lang="en-GB" altLang="zh-HK" sz="5000" b="1" dirty="0" smtClean="0">
+                <a:latin typeface="Calibri" panose="020F0502020204030204" pitchFamily="34" charset="0"/>
+                <a:cs typeface="Calibri" panose="020F0502020204030204" pitchFamily="34" charset="0"/>
+              </a:rPr>
+              <a:t>Music </a:t>
+            </a:r>
+            <a:r>
+              <a:rPr lang="en-GB" altLang="zh-HK" sz="5000" b="1" dirty="0">
+                <a:latin typeface="Calibri" panose="020F0502020204030204" pitchFamily="34" charset="0"/>
+                <a:cs typeface="Calibri" panose="020F0502020204030204" pitchFamily="34" charset="0"/>
+              </a:rPr>
+              <a:t/>
             </a:r>
             <a:br>
               <a:rPr lang="en-GB" altLang="zh-HK" sz="5000" b="1" dirty="0">
@@ -5124,7 +5101,7 @@
           <p:cNvPr id="3" name="Subtitle 2">
             <a:extLst>
               <a:ext uri="{FF2B5EF4-FFF2-40B4-BE49-F238E27FC236}">
-                <a16:creationId xmlns:a16="http://schemas.microsoft.com/office/drawing/2014/main" xmlns="" id="{E036FD49-E44D-4839-923D-D9F281215FB2}"/>
+                <a16:creationId xmlns="" xmlns:a16="http://schemas.microsoft.com/office/drawing/2014/main" id="{E036FD49-E44D-4839-923D-D9F281215FB2}"/>
               </a:ext>
             </a:extLst>
           </p:cNvPr>
@@ -5170,7 +5147,7 @@
           <p:cNvPr id="5" name="Picture 4" descr="A close up of a mans face&#10;&#10;Description generated with high confidence">
             <a:extLst>
               <a:ext uri="{FF2B5EF4-FFF2-40B4-BE49-F238E27FC236}">
-                <a16:creationId xmlns:a16="http://schemas.microsoft.com/office/drawing/2014/main" xmlns="" id="{B4E85165-2419-4F32-B5F6-AD8FE982C59A}"/>
+                <a16:creationId xmlns="" xmlns:a16="http://schemas.microsoft.com/office/drawing/2014/main" id="{B4E85165-2419-4F32-B5F6-AD8FE982C59A}"/>
               </a:ext>
             </a:extLst>
           </p:cNvPr>
@@ -5206,10 +5183,10 @@
           <p:cNvPr id="14" name="Rectangle 13">
             <a:extLst>
               <a:ext uri="{FF2B5EF4-FFF2-40B4-BE49-F238E27FC236}">
-                <a16:creationId xmlns:a16="http://schemas.microsoft.com/office/drawing/2014/main" xmlns="" id="{4E34A3B6-BAD2-4156-BDC6-4736248BFDE0}"/>
+                <a16:creationId xmlns="" xmlns:a16="http://schemas.microsoft.com/office/drawing/2014/main" id="{4E34A3B6-BAD2-4156-BDC6-4736248BFDE0}"/>
               </a:ext>
               <a:ext uri="{C183D7F6-B498-43B3-948B-1728B52AA6E4}">
-                <adec:decorative xmlns:adec="http://schemas.microsoft.com/office/drawing/2017/decorative" xmlns="" val="1"/>
+                <adec:decorative xmlns="" xmlns:adec="http://schemas.microsoft.com/office/drawing/2017/decorative" val="1"/>
               </a:ext>
             </a:extLst>
           </p:cNvPr>
@@ -5219,7 +5196,7 @@
           <p:nvPr>
             <p:extLst>
               <p:ext uri="{386F3935-93C4-4BCD-93E2-E3B085C9AB24}">
-                <p16:designElem xmlns:p16="http://schemas.microsoft.com/office/powerpoint/2015/main" xmlns="" val="1"/>
+                <p16:designElem xmlns="" xmlns:p16="http://schemas.microsoft.com/office/powerpoint/2015/main" val="1"/>
               </p:ext>
             </p:extLst>
           </p:nvPr>
@@ -5268,13 +5245,13 @@
   <p:clrMapOvr>
     <a:masterClrMapping/>
   </p:clrMapOvr>
-  <mc:AlternateContent xmlns:mc="http://schemas.openxmlformats.org/markup-compatibility/2006">
-    <mc:Choice xmlns:p14="http://schemas.microsoft.com/office/powerpoint/2010/main" Requires="p14">
+  <mc:AlternateContent xmlns:mc="http://schemas.openxmlformats.org/markup-compatibility/2006" xmlns:p14="http://schemas.microsoft.com/office/powerpoint/2010/main">
+    <mc:Choice Requires="p14">
       <p:transition spd="med" p14:dur="700">
         <p:fade/>
       </p:transition>
     </mc:Choice>
-    <mc:Fallback>
+    <mc:Fallback xmlns="">
       <p:transition spd="med">
         <p:fade/>
       </p:transition>
@@ -5493,13 +5470,13 @@
   <p:clrMapOvr>
     <a:masterClrMapping/>
   </p:clrMapOvr>
-  <mc:AlternateContent xmlns:mc="http://schemas.openxmlformats.org/markup-compatibility/2006">
-    <mc:Choice xmlns:p14="http://schemas.microsoft.com/office/powerpoint/2010/main" Requires="p14">
+  <mc:AlternateContent xmlns:mc="http://schemas.openxmlformats.org/markup-compatibility/2006" xmlns:p14="http://schemas.microsoft.com/office/powerpoint/2010/main">
+    <mc:Choice Requires="p14">
       <p:transition spd="med" p14:dur="700">
         <p:fade/>
       </p:transition>
     </mc:Choice>
-    <mc:Fallback>
+    <mc:Fallback xmlns="">
       <p:transition spd="med">
         <p:fade/>
       </p:transition>
@@ -5718,13 +5695,13 @@
   <p:clrMapOvr>
     <a:masterClrMapping/>
   </p:clrMapOvr>
-  <mc:AlternateContent xmlns:mc="http://schemas.openxmlformats.org/markup-compatibility/2006">
-    <mc:Choice xmlns:p14="http://schemas.microsoft.com/office/powerpoint/2010/main" Requires="p14">
+  <mc:AlternateContent xmlns:mc="http://schemas.openxmlformats.org/markup-compatibility/2006" xmlns:p14="http://schemas.microsoft.com/office/powerpoint/2010/main">
+    <mc:Choice Requires="p14">
       <p:transition spd="med" p14:dur="700">
         <p:fade/>
       </p:transition>
     </mc:Choice>
-    <mc:Fallback>
+    <mc:Fallback xmlns="">
       <p:transition spd="med">
         <p:fade/>
       </p:transition>
@@ -5911,13 +5888,13 @@
   <p:clrMapOvr>
     <a:masterClrMapping/>
   </p:clrMapOvr>
-  <mc:AlternateContent xmlns:mc="http://schemas.openxmlformats.org/markup-compatibility/2006">
-    <mc:Choice xmlns:p14="http://schemas.microsoft.com/office/powerpoint/2010/main" Requires="p14">
+  <mc:AlternateContent xmlns:mc="http://schemas.openxmlformats.org/markup-compatibility/2006" xmlns:p14="http://schemas.microsoft.com/office/powerpoint/2010/main">
+    <mc:Choice Requires="p14">
       <p:transition spd="med" p14:dur="700">
         <p:fade/>
       </p:transition>
     </mc:Choice>
-    <mc:Fallback>
+    <mc:Fallback xmlns="">
       <p:transition spd="med">
         <p:fade/>
       </p:transition>
@@ -5955,10 +5932,10 @@
           <p:cNvPr id="19" name="Rectangle 18">
             <a:extLst>
               <a:ext uri="{FF2B5EF4-FFF2-40B4-BE49-F238E27FC236}">
-                <a16:creationId xmlns:a16="http://schemas.microsoft.com/office/drawing/2014/main" xmlns="" id="{57F231E5-F402-49E1-82B4-C762909ED227}"/>
+                <a16:creationId xmlns="" xmlns:a16="http://schemas.microsoft.com/office/drawing/2014/main" id="{57F231E5-F402-49E1-82B4-C762909ED227}"/>
               </a:ext>
               <a:ext uri="{C183D7F6-B498-43B3-948B-1728B52AA6E4}">
-                <adec:decorative xmlns:adec="http://schemas.microsoft.com/office/drawing/2017/decorative" xmlns="" val="1"/>
+                <adec:decorative xmlns="" xmlns:adec="http://schemas.microsoft.com/office/drawing/2017/decorative" val="1"/>
               </a:ext>
             </a:extLst>
           </p:cNvPr>
@@ -5968,7 +5945,7 @@
           <p:nvPr>
             <p:extLst>
               <p:ext uri="{386F3935-93C4-4BCD-93E2-E3B085C9AB24}">
-                <p16:designElem xmlns:p16="http://schemas.microsoft.com/office/powerpoint/2015/main" xmlns="" val="1"/>
+                <p16:designElem xmlns="" xmlns:p16="http://schemas.microsoft.com/office/powerpoint/2015/main" val="1"/>
               </p:ext>
             </p:extLst>
           </p:nvPr>
@@ -6015,10 +5992,10 @@
           <p:cNvPr id="21" name="Freeform: Shape 20">
             <a:extLst>
               <a:ext uri="{FF2B5EF4-FFF2-40B4-BE49-F238E27FC236}">
-                <a16:creationId xmlns:a16="http://schemas.microsoft.com/office/drawing/2014/main" xmlns="" id="{6F0BA12B-74D1-4DB1-9A3F-C9BA27B81512}"/>
+                <a16:creationId xmlns="" xmlns:a16="http://schemas.microsoft.com/office/drawing/2014/main" id="{6F0BA12B-74D1-4DB1-9A3F-C9BA27B81512}"/>
               </a:ext>
               <a:ext uri="{C183D7F6-B498-43B3-948B-1728B52AA6E4}">
-                <adec:decorative xmlns:adec="http://schemas.microsoft.com/office/drawing/2017/decorative" xmlns="" val="1"/>
+                <adec:decorative xmlns="" xmlns:adec="http://schemas.microsoft.com/office/drawing/2017/decorative" val="1"/>
               </a:ext>
             </a:extLst>
           </p:cNvPr>
@@ -6028,7 +6005,7 @@
           <p:nvPr>
             <p:extLst>
               <p:ext uri="{386F3935-93C4-4BCD-93E2-E3B085C9AB24}">
-                <p16:designElem xmlns:p16="http://schemas.microsoft.com/office/powerpoint/2015/main" xmlns="" val="1"/>
+                <p16:designElem xmlns="" xmlns:p16="http://schemas.microsoft.com/office/powerpoint/2015/main" val="1"/>
               </p:ext>
             </p:extLst>
           </p:nvPr>
@@ -6113,10 +6090,10 @@
           <p:cNvPr id="23" name="Freeform: Shape 22">
             <a:extLst>
               <a:ext uri="{FF2B5EF4-FFF2-40B4-BE49-F238E27FC236}">
-                <a16:creationId xmlns:a16="http://schemas.microsoft.com/office/drawing/2014/main" xmlns="" id="{515FCC40-AA93-4D3B-90D0-69BC824EAD47}"/>
+                <a16:creationId xmlns="" xmlns:a16="http://schemas.microsoft.com/office/drawing/2014/main" id="{515FCC40-AA93-4D3B-90D0-69BC824EAD47}"/>
               </a:ext>
               <a:ext uri="{C183D7F6-B498-43B3-948B-1728B52AA6E4}">
-                <adec:decorative xmlns:adec="http://schemas.microsoft.com/office/drawing/2017/decorative" xmlns="" val="1"/>
+                <adec:decorative xmlns="" xmlns:adec="http://schemas.microsoft.com/office/drawing/2017/decorative" val="1"/>
               </a:ext>
             </a:extLst>
           </p:cNvPr>
@@ -6126,7 +6103,7 @@
           <p:nvPr>
             <p:extLst>
               <p:ext uri="{386F3935-93C4-4BCD-93E2-E3B085C9AB24}">
-                <p16:designElem xmlns:p16="http://schemas.microsoft.com/office/powerpoint/2015/main" xmlns="" val="1"/>
+                <p16:designElem xmlns="" xmlns:p16="http://schemas.microsoft.com/office/powerpoint/2015/main" val="1"/>
               </p:ext>
             </p:extLst>
           </p:nvPr>
@@ -6203,7 +6180,7 @@
           <p:cNvPr id="7" name="Subtitle 2">
             <a:extLst>
               <a:ext uri="{FF2B5EF4-FFF2-40B4-BE49-F238E27FC236}">
-                <a16:creationId xmlns:a16="http://schemas.microsoft.com/office/drawing/2014/main" xmlns="" id="{816F833A-AE27-46D2-AFAE-00251F2B16E7}"/>
+                <a16:creationId xmlns="" xmlns:a16="http://schemas.microsoft.com/office/drawing/2014/main" id="{816F833A-AE27-46D2-AFAE-00251F2B16E7}"/>
               </a:ext>
             </a:extLst>
           </p:cNvPr>
@@ -6506,18 +6483,7 @@
                 <a:ea typeface="+mj-ea"/>
                 <a:cs typeface="+mj-cs"/>
               </a:rPr>
-              <a:t>results</a:t>
-            </a:r>
-            <a:r>
-              <a:rPr lang="en-US" altLang="zh-HK" sz="5000" b="1" spc="-100" dirty="0" smtClean="0">
-                <a:solidFill>
-                  <a:schemeClr val="bg1"/>
-                </a:solidFill>
-                <a:latin typeface="+mj-lt"/>
-                <a:ea typeface="+mj-ea"/>
-                <a:cs typeface="+mj-cs"/>
-              </a:rPr>
-              <a:t>:</a:t>
+              <a:t>results:</a:t>
             </a:r>
             <a:endParaRPr lang="en-US" altLang="zh-HK" sz="5000" b="1" spc="-100" dirty="0">
               <a:solidFill>
@@ -6535,7 +6501,7 @@
           <p:cNvPr id="3" name="Subtitle 2">
             <a:extLst>
               <a:ext uri="{FF2B5EF4-FFF2-40B4-BE49-F238E27FC236}">
-                <a16:creationId xmlns:a16="http://schemas.microsoft.com/office/drawing/2014/main" xmlns="" id="{39E6B6BE-9679-4F0C-8ED6-A4BD5C363054}"/>
+                <a16:creationId xmlns="" xmlns:a16="http://schemas.microsoft.com/office/drawing/2014/main" id="{39E6B6BE-9679-4F0C-8ED6-A4BD5C363054}"/>
               </a:ext>
             </a:extLst>
           </p:cNvPr>
@@ -6548,7 +6514,7 @@
         </p:nvSpPr>
         <p:spPr>
           <a:xfrm>
-            <a:off x="3943896" y="2926200"/>
+            <a:off x="3943896" y="2043544"/>
             <a:ext cx="7246621" cy="2770911"/>
           </a:xfrm>
         </p:spPr>
@@ -6575,15 +6541,7 @@
                   <a:schemeClr val="accent1"/>
                 </a:solidFill>
               </a:rPr>
-              <a:t> </a:t>
-            </a:r>
-            <a:r>
-              <a:rPr lang="en-GB" altLang="zh-HK" sz="3200" b="1" dirty="0" smtClean="0">
-                <a:solidFill>
-                  <a:schemeClr val="accent1"/>
-                </a:solidFill>
-              </a:rPr>
-              <a:t>Layers</a:t>
+              <a:t> Layers</a:t>
             </a:r>
             <a:endParaRPr lang="en-GB" altLang="zh-HK" sz="3200" b="1" dirty="0">
               <a:solidFill>
@@ -6689,13 +6647,13 @@
   <p:clrMapOvr>
     <a:masterClrMapping/>
   </p:clrMapOvr>
-  <mc:AlternateContent xmlns:mc="http://schemas.openxmlformats.org/markup-compatibility/2006">
-    <mc:Choice xmlns:p14="http://schemas.microsoft.com/office/powerpoint/2010/main" Requires="p14">
+  <mc:AlternateContent xmlns:mc="http://schemas.openxmlformats.org/markup-compatibility/2006" xmlns:p14="http://schemas.microsoft.com/office/powerpoint/2010/main">
+    <mc:Choice Requires="p14">
       <p:transition spd="med" p14:dur="700">
         <p:fade/>
       </p:transition>
     </mc:Choice>
-    <mc:Fallback>
+    <mc:Fallback xmlns="">
       <p:transition spd="med">
         <p:fade/>
       </p:transition>
@@ -6757,7 +6715,7 @@
             <a:hlinkClick r:id="" action="ppaction://media"/>
             <a:extLst>
               <a:ext uri="{FF2B5EF4-FFF2-40B4-BE49-F238E27FC236}">
-                <a16:creationId xmlns:a16="http://schemas.microsoft.com/office/drawing/2014/main" xmlns="" id="{079784F7-C2BA-45CC-B6A8-67F07D1F8D1A}"/>
+                <a16:creationId xmlns="" xmlns:a16="http://schemas.microsoft.com/office/drawing/2014/main" id="{079784F7-C2BA-45CC-B6A8-67F07D1F8D1A}"/>
               </a:ext>
             </a:extLst>
           </p:cNvPr>
@@ -6837,13 +6795,13 @@
   <p:clrMapOvr>
     <a:masterClrMapping/>
   </p:clrMapOvr>
-  <mc:AlternateContent xmlns:mc="http://schemas.openxmlformats.org/markup-compatibility/2006">
-    <mc:Choice xmlns:p14="http://schemas.microsoft.com/office/powerpoint/2010/main" Requires="p14">
+  <mc:AlternateContent xmlns:mc="http://schemas.openxmlformats.org/markup-compatibility/2006" xmlns:p14="http://schemas.microsoft.com/office/powerpoint/2010/main">
+    <mc:Choice Requires="p14">
       <p:transition spd="med" p14:dur="700">
         <p:fade/>
       </p:transition>
     </mc:Choice>
-    <mc:Fallback>
+    <mc:Fallback xmlns="">
       <p:transition spd="med">
         <p:fade/>
       </p:transition>
@@ -7062,13 +7020,13 @@
   <p:clrMapOvr>
     <a:masterClrMapping/>
   </p:clrMapOvr>
-  <mc:AlternateContent xmlns:mc="http://schemas.openxmlformats.org/markup-compatibility/2006">
-    <mc:Choice xmlns:p14="http://schemas.microsoft.com/office/powerpoint/2010/main" Requires="p14">
+  <mc:AlternateContent xmlns:mc="http://schemas.openxmlformats.org/markup-compatibility/2006" xmlns:p14="http://schemas.microsoft.com/office/powerpoint/2010/main">
+    <mc:Choice Requires="p14">
       <p:transition spd="med" p14:dur="700">
         <p:fade/>
       </p:transition>
     </mc:Choice>
-    <mc:Fallback>
+    <mc:Fallback xmlns="">
       <p:transition spd="med">
         <p:fade/>
       </p:transition>
@@ -7285,13 +7243,13 @@
   <p:clrMapOvr>
     <a:masterClrMapping/>
   </p:clrMapOvr>
-  <mc:AlternateContent xmlns:mc="http://schemas.openxmlformats.org/markup-compatibility/2006">
-    <mc:Choice xmlns:p14="http://schemas.microsoft.com/office/powerpoint/2010/main" Requires="p14">
+  <mc:AlternateContent xmlns:mc="http://schemas.openxmlformats.org/markup-compatibility/2006" xmlns:p14="http://schemas.microsoft.com/office/powerpoint/2010/main">
+    <mc:Choice Requires="p14">
       <p:transition spd="med" p14:dur="700">
         <p:fade/>
       </p:transition>
     </mc:Choice>
-    <mc:Fallback>
+    <mc:Fallback xmlns="">
       <p:transition spd="med">
         <p:fade/>
       </p:transition>
@@ -7409,10 +7367,10 @@
           <p:cNvPr id="19" name="Rectangle 18">
             <a:extLst>
               <a:ext uri="{FF2B5EF4-FFF2-40B4-BE49-F238E27FC236}">
-                <a16:creationId xmlns:a16="http://schemas.microsoft.com/office/drawing/2014/main" xmlns="" id="{57F231E5-F402-49E1-82B4-C762909ED227}"/>
+                <a16:creationId xmlns="" xmlns:a16="http://schemas.microsoft.com/office/drawing/2014/main" id="{57F231E5-F402-49E1-82B4-C762909ED227}"/>
               </a:ext>
               <a:ext uri="{C183D7F6-B498-43B3-948B-1728B52AA6E4}">
-                <adec:decorative xmlns:adec="http://schemas.microsoft.com/office/drawing/2017/decorative" xmlns="" val="1"/>
+                <adec:decorative xmlns="" xmlns:adec="http://schemas.microsoft.com/office/drawing/2017/decorative" val="1"/>
               </a:ext>
             </a:extLst>
           </p:cNvPr>
@@ -7422,7 +7380,7 @@
           <p:nvPr>
             <p:extLst>
               <p:ext uri="{386F3935-93C4-4BCD-93E2-E3B085C9AB24}">
-                <p16:designElem xmlns:p16="http://schemas.microsoft.com/office/powerpoint/2015/main" xmlns="" val="1"/>
+                <p16:designElem xmlns="" xmlns:p16="http://schemas.microsoft.com/office/powerpoint/2015/main" val="1"/>
               </p:ext>
             </p:extLst>
           </p:nvPr>
@@ -7469,10 +7427,10 @@
           <p:cNvPr id="21" name="Freeform: Shape 20">
             <a:extLst>
               <a:ext uri="{FF2B5EF4-FFF2-40B4-BE49-F238E27FC236}">
-                <a16:creationId xmlns:a16="http://schemas.microsoft.com/office/drawing/2014/main" xmlns="" id="{6F0BA12B-74D1-4DB1-9A3F-C9BA27B81512}"/>
+                <a16:creationId xmlns="" xmlns:a16="http://schemas.microsoft.com/office/drawing/2014/main" id="{6F0BA12B-74D1-4DB1-9A3F-C9BA27B81512}"/>
               </a:ext>
               <a:ext uri="{C183D7F6-B498-43B3-948B-1728B52AA6E4}">
-                <adec:decorative xmlns:adec="http://schemas.microsoft.com/office/drawing/2017/decorative" xmlns="" val="1"/>
+                <adec:decorative xmlns="" xmlns:adec="http://schemas.microsoft.com/office/drawing/2017/decorative" val="1"/>
               </a:ext>
             </a:extLst>
           </p:cNvPr>
@@ -7482,7 +7440,7 @@
           <p:nvPr>
             <p:extLst>
               <p:ext uri="{386F3935-93C4-4BCD-93E2-E3B085C9AB24}">
-                <p16:designElem xmlns:p16="http://schemas.microsoft.com/office/powerpoint/2015/main" xmlns="" val="1"/>
+                <p16:designElem xmlns="" xmlns:p16="http://schemas.microsoft.com/office/powerpoint/2015/main" val="1"/>
               </p:ext>
             </p:extLst>
           </p:nvPr>
@@ -7567,10 +7525,10 @@
           <p:cNvPr id="23" name="Freeform: Shape 22">
             <a:extLst>
               <a:ext uri="{FF2B5EF4-FFF2-40B4-BE49-F238E27FC236}">
-                <a16:creationId xmlns:a16="http://schemas.microsoft.com/office/drawing/2014/main" xmlns="" id="{515FCC40-AA93-4D3B-90D0-69BC824EAD47}"/>
+                <a16:creationId xmlns="" xmlns:a16="http://schemas.microsoft.com/office/drawing/2014/main" id="{515FCC40-AA93-4D3B-90D0-69BC824EAD47}"/>
               </a:ext>
               <a:ext uri="{C183D7F6-B498-43B3-948B-1728B52AA6E4}">
-                <adec:decorative xmlns:adec="http://schemas.microsoft.com/office/drawing/2017/decorative" xmlns="" val="1"/>
+                <adec:decorative xmlns="" xmlns:adec="http://schemas.microsoft.com/office/drawing/2017/decorative" val="1"/>
               </a:ext>
             </a:extLst>
           </p:cNvPr>
@@ -7580,7 +7538,7 @@
           <p:nvPr>
             <p:extLst>
               <p:ext uri="{386F3935-93C4-4BCD-93E2-E3B085C9AB24}">
-                <p16:designElem xmlns:p16="http://schemas.microsoft.com/office/powerpoint/2015/main" xmlns="" val="1"/>
+                <p16:designElem xmlns="" xmlns:p16="http://schemas.microsoft.com/office/powerpoint/2015/main" val="1"/>
               </p:ext>
             </p:extLst>
           </p:nvPr>
@@ -7657,7 +7615,7 @@
           <p:cNvPr id="7" name="Subtitle 2">
             <a:extLst>
               <a:ext uri="{FF2B5EF4-FFF2-40B4-BE49-F238E27FC236}">
-                <a16:creationId xmlns:a16="http://schemas.microsoft.com/office/drawing/2014/main" xmlns="" id="{816F833A-AE27-46D2-AFAE-00251F2B16E7}"/>
+                <a16:creationId xmlns="" xmlns:a16="http://schemas.microsoft.com/office/drawing/2014/main" id="{816F833A-AE27-46D2-AFAE-00251F2B16E7}"/>
               </a:ext>
             </a:extLst>
           </p:cNvPr>
@@ -7960,18 +7918,7 @@
                 <a:ea typeface="+mj-ea"/>
                 <a:cs typeface="+mj-cs"/>
               </a:rPr>
-              <a:t>results</a:t>
-            </a:r>
-            <a:r>
-              <a:rPr lang="en-US" altLang="zh-HK" sz="5000" b="1" spc="-100" dirty="0" smtClean="0">
-                <a:solidFill>
-                  <a:schemeClr val="bg1"/>
-                </a:solidFill>
-                <a:latin typeface="+mj-lt"/>
-                <a:ea typeface="+mj-ea"/>
-                <a:cs typeface="+mj-cs"/>
-              </a:rPr>
-              <a:t>:</a:t>
+              <a:t>results:</a:t>
             </a:r>
             <a:endParaRPr lang="en-US" altLang="zh-HK" sz="5000" b="1" spc="-100" dirty="0">
               <a:solidFill>
@@ -7989,7 +7936,7 @@
           <p:cNvPr id="3" name="Subtitle 2">
             <a:extLst>
               <a:ext uri="{FF2B5EF4-FFF2-40B4-BE49-F238E27FC236}">
-                <a16:creationId xmlns:a16="http://schemas.microsoft.com/office/drawing/2014/main" xmlns="" id="{39E6B6BE-9679-4F0C-8ED6-A4BD5C363054}"/>
+                <a16:creationId xmlns="" xmlns:a16="http://schemas.microsoft.com/office/drawing/2014/main" id="{39E6B6BE-9679-4F0C-8ED6-A4BD5C363054}"/>
               </a:ext>
             </a:extLst>
           </p:cNvPr>
@@ -8002,7 +7949,7 @@
         </p:nvSpPr>
         <p:spPr>
           <a:xfrm>
-            <a:off x="3943896" y="2926200"/>
+            <a:off x="4007315" y="2043543"/>
             <a:ext cx="7246621" cy="2770911"/>
           </a:xfrm>
         </p:spPr>
@@ -8140,13 +8087,13 @@
   <p:clrMapOvr>
     <a:masterClrMapping/>
   </p:clrMapOvr>
-  <mc:AlternateContent xmlns:mc="http://schemas.openxmlformats.org/markup-compatibility/2006">
-    <mc:Choice xmlns:p14="http://schemas.microsoft.com/office/powerpoint/2010/main" Requires="p14">
+  <mc:AlternateContent xmlns:mc="http://schemas.openxmlformats.org/markup-compatibility/2006" xmlns:p14="http://schemas.microsoft.com/office/powerpoint/2010/main">
+    <mc:Choice Requires="p14">
       <p:transition spd="med" p14:dur="700">
         <p:fade/>
       </p:transition>
     </mc:Choice>
-    <mc:Fallback>
+    <mc:Fallback xmlns="">
       <p:transition spd="med">
         <p:fade/>
       </p:transition>
@@ -8283,13 +8230,13 @@
   <p:clrMapOvr>
     <a:masterClrMapping/>
   </p:clrMapOvr>
-  <mc:AlternateContent xmlns:mc="http://schemas.openxmlformats.org/markup-compatibility/2006">
-    <mc:Choice xmlns:p14="http://schemas.microsoft.com/office/powerpoint/2010/main" Requires="p14">
+  <mc:AlternateContent xmlns:mc="http://schemas.openxmlformats.org/markup-compatibility/2006" xmlns:p14="http://schemas.microsoft.com/office/powerpoint/2010/main">
+    <mc:Choice Requires="p14">
       <p:transition spd="med" p14:dur="700">
         <p:fade/>
       </p:transition>
     </mc:Choice>
-    <mc:Fallback>
+    <mc:Fallback xmlns="">
       <p:transition spd="med">
         <p:fade/>
       </p:transition>
@@ -8455,7 +8402,7 @@
         </p:blipFill>
         <p:spPr>
           <a:xfrm>
-            <a:off x="6770136" y="2750753"/>
+            <a:off x="6758104" y="2758774"/>
             <a:ext cx="1347350" cy="1347350"/>
           </a:xfrm>
           <a:prstGeom prst="rect">
@@ -8511,13 +8458,13 @@
   <p:clrMapOvr>
     <a:masterClrMapping/>
   </p:clrMapOvr>
-  <mc:AlternateContent xmlns:mc="http://schemas.openxmlformats.org/markup-compatibility/2006">
-    <mc:Choice xmlns:p14="http://schemas.microsoft.com/office/powerpoint/2010/main" Requires="p14">
+  <mc:AlternateContent xmlns:mc="http://schemas.openxmlformats.org/markup-compatibility/2006" xmlns:p14="http://schemas.microsoft.com/office/powerpoint/2010/main">
+    <mc:Choice Requires="p14">
       <p:transition spd="med" p14:dur="700">
         <p:fade/>
       </p:transition>
     </mc:Choice>
-    <mc:Fallback>
+    <mc:Fallback xmlns="">
       <p:transition spd="med">
         <p:fade/>
       </p:transition>
@@ -8784,13 +8731,13 @@
   <p:clrMapOvr>
     <a:masterClrMapping/>
   </p:clrMapOvr>
-  <mc:AlternateContent xmlns:mc="http://schemas.openxmlformats.org/markup-compatibility/2006">
-    <mc:Choice xmlns:p14="http://schemas.microsoft.com/office/powerpoint/2010/main" Requires="p14">
+  <mc:AlternateContent xmlns:mc="http://schemas.openxmlformats.org/markup-compatibility/2006" xmlns:p14="http://schemas.microsoft.com/office/powerpoint/2010/main">
+    <mc:Choice Requires="p14">
       <p:transition spd="med" p14:dur="700">
         <p:fade/>
       </p:transition>
     </mc:Choice>
-    <mc:Fallback>
+    <mc:Fallback xmlns="">
       <p:transition spd="med">
         <p:fade/>
       </p:transition>
@@ -8977,13 +8924,13 @@
   <p:clrMapOvr>
     <a:masterClrMapping/>
   </p:clrMapOvr>
-  <mc:AlternateContent xmlns:mc="http://schemas.openxmlformats.org/markup-compatibility/2006">
-    <mc:Choice xmlns:p14="http://schemas.microsoft.com/office/powerpoint/2010/main" Requires="p14">
+  <mc:AlternateContent xmlns:mc="http://schemas.openxmlformats.org/markup-compatibility/2006" xmlns:p14="http://schemas.microsoft.com/office/powerpoint/2010/main">
+    <mc:Choice Requires="p14">
       <p:transition spd="med" p14:dur="700">
         <p:fade/>
       </p:transition>
     </mc:Choice>
-    <mc:Fallback>
+    <mc:Fallback xmlns="">
       <p:transition spd="med">
         <p:fade/>
       </p:transition>
@@ -9044,11 +8991,6 @@
               </a:rPr>
               <a:t>Reflection:</a:t>
             </a:r>
-            <a:endParaRPr lang="en-US" altLang="zh-HK" b="1" spc="-100" dirty="0">
-              <a:solidFill>
-                <a:schemeClr val="bg1"/>
-              </a:solidFill>
-            </a:endParaRPr>
           </a:p>
         </p:txBody>
       </p:sp>
@@ -9140,13 +9082,13 @@
   <p:clrMapOvr>
     <a:masterClrMapping/>
   </p:clrMapOvr>
-  <mc:AlternateContent xmlns:mc="http://schemas.openxmlformats.org/markup-compatibility/2006">
-    <mc:Choice xmlns:p14="http://schemas.microsoft.com/office/powerpoint/2010/main" Requires="p14">
+  <mc:AlternateContent xmlns:mc="http://schemas.openxmlformats.org/markup-compatibility/2006" xmlns:p14="http://schemas.microsoft.com/office/powerpoint/2010/main">
+    <mc:Choice Requires="p14">
       <p:transition spd="med" p14:dur="700">
         <p:fade/>
       </p:transition>
     </mc:Choice>
-    <mc:Fallback>
+    <mc:Fallback xmlns="">
       <p:transition spd="med">
         <p:fade/>
       </p:transition>
@@ -9298,13 +9240,13 @@
   <p:clrMapOvr>
     <a:masterClrMapping/>
   </p:clrMapOvr>
-  <mc:AlternateContent xmlns:mc="http://schemas.openxmlformats.org/markup-compatibility/2006">
-    <mc:Choice xmlns:p14="http://schemas.microsoft.com/office/powerpoint/2010/main" Requires="p14">
+  <mc:AlternateContent xmlns:mc="http://schemas.openxmlformats.org/markup-compatibility/2006" xmlns:p14="http://schemas.microsoft.com/office/powerpoint/2010/main">
+    <mc:Choice Requires="p14">
       <p:transition spd="med" p14:dur="700">
         <p:fade/>
       </p:transition>
     </mc:Choice>
-    <mc:Fallback>
+    <mc:Fallback xmlns="">
       <p:transition spd="med">
         <p:fade/>
       </p:transition>
@@ -9457,13 +9399,13 @@
   <p:clrMapOvr>
     <a:masterClrMapping/>
   </p:clrMapOvr>
-  <mc:AlternateContent xmlns:mc="http://schemas.openxmlformats.org/markup-compatibility/2006">
-    <mc:Choice xmlns:p14="http://schemas.microsoft.com/office/powerpoint/2010/main" Requires="p14">
+  <mc:AlternateContent xmlns:mc="http://schemas.openxmlformats.org/markup-compatibility/2006" xmlns:p14="http://schemas.microsoft.com/office/powerpoint/2010/main">
+    <mc:Choice Requires="p14">
       <p:transition spd="med" p14:dur="700">
         <p:fade/>
       </p:transition>
     </mc:Choice>
-    <mc:Fallback>
+    <mc:Fallback xmlns="">
       <p:transition spd="med">
         <p:fade/>
       </p:transition>
@@ -9480,212 +9422,6 @@
 </file>
 
 <file path=ppt/slides/slide24.xml><?xml version="1.0" encoding="utf-8"?>
-<p:sld xmlns:a="http://schemas.openxmlformats.org/drawingml/2006/main" xmlns:r="http://schemas.openxmlformats.org/officeDocument/2006/relationships" xmlns:p="http://schemas.openxmlformats.org/presentationml/2006/main">
-  <p:cSld>
-    <p:spTree>
-      <p:nvGrpSpPr>
-        <p:cNvPr id="1" name=""/>
-        <p:cNvGrpSpPr/>
-        <p:nvPr/>
-      </p:nvGrpSpPr>
-      <p:grpSpPr>
-        <a:xfrm>
-          <a:off x="0" y="0"/>
-          <a:ext cx="0" cy="0"/>
-          <a:chOff x="0" y="0"/>
-          <a:chExt cx="0" cy="0"/>
-        </a:xfrm>
-      </p:grpSpPr>
-      <p:sp>
-        <p:nvSpPr>
-          <p:cNvPr id="2" name="Title 1"/>
-          <p:cNvSpPr>
-            <a:spLocks noGrp="1"/>
-          </p:cNvSpPr>
-          <p:nvPr>
-            <p:ph type="title"/>
-          </p:nvPr>
-        </p:nvSpPr>
-        <p:spPr/>
-        <p:txBody>
-          <a:bodyPr/>
-          <a:lstStyle/>
-          <a:p>
-            <a:r>
-              <a:rPr lang="en-US" dirty="0" smtClean="0"/>
-              <a:t>WORKING AGENDA</a:t>
-            </a:r>
-            <a:endParaRPr lang="en-US" dirty="0"/>
-          </a:p>
-        </p:txBody>
-      </p:sp>
-      <p:sp>
-        <p:nvSpPr>
-          <p:cNvPr id="3" name="Content Placeholder 2"/>
-          <p:cNvSpPr>
-            <a:spLocks noGrp="1"/>
-          </p:cNvSpPr>
-          <p:nvPr>
-            <p:ph idx="1"/>
-          </p:nvPr>
-        </p:nvSpPr>
-        <p:spPr/>
-        <p:txBody>
-          <a:bodyPr>
-            <a:normAutofit fontScale="92500"/>
-          </a:bodyPr>
-          <a:lstStyle/>
-          <a:p>
-            <a:r>
-              <a:rPr lang="en-US" dirty="0" smtClean="0"/>
-              <a:t>Revival of Queen/Freddy Mercury</a:t>
-            </a:r>
-          </a:p>
-          <a:p>
-            <a:r>
-              <a:rPr lang="en-US" dirty="0" smtClean="0"/>
-              <a:t>Data Collecting/Cleaning</a:t>
-            </a:r>
-          </a:p>
-          <a:p>
-            <a:r>
-              <a:rPr lang="en-US" dirty="0" smtClean="0"/>
-              <a:t>Methodology/Architecture</a:t>
-            </a:r>
-          </a:p>
-          <a:p>
-            <a:r>
-              <a:rPr lang="en-US" dirty="0" smtClean="0"/>
-              <a:t>Trial 1 </a:t>
-            </a:r>
-            <a:r>
-              <a:rPr lang="en-US" dirty="0" smtClean="0"/>
-              <a:t>(1, 10, 40 </a:t>
-            </a:r>
-            <a:r>
-              <a:rPr lang="en-US" dirty="0" smtClean="0"/>
-              <a:t>epochs</a:t>
-            </a:r>
-            <a:r>
-              <a:rPr lang="en-US" dirty="0" smtClean="0"/>
-              <a:t>) loss &gt; 2, basic patterns and repetition</a:t>
-            </a:r>
-            <a:endParaRPr lang="en-US" dirty="0" smtClean="0"/>
-          </a:p>
-          <a:p>
-            <a:r>
-              <a:rPr lang="en-US" dirty="0" smtClean="0"/>
-              <a:t>Trial 2 (Queen 100 epoch) loss 0.3</a:t>
-            </a:r>
-          </a:p>
-          <a:p>
-            <a:r>
-              <a:rPr lang="en-US" dirty="0" smtClean="0"/>
-              <a:t>Trial 2.5 (Beethoven 100 epoch) loss 0.2</a:t>
-            </a:r>
-          </a:p>
-          <a:p>
-            <a:r>
-              <a:rPr lang="en-US" dirty="0" smtClean="0"/>
-              <a:t>Trial 3 (100 epoch Queen piano </a:t>
-            </a:r>
-            <a:r>
-              <a:rPr lang="en-US" dirty="0" smtClean="0"/>
-              <a:t>and bass </a:t>
-            </a:r>
-            <a:r>
-              <a:rPr lang="en-US" dirty="0" smtClean="0"/>
-              <a:t>only </a:t>
-            </a:r>
-            <a:r>
-              <a:rPr lang="en-US" dirty="0" smtClean="0"/>
-              <a:t>vectors 3 layers) loss </a:t>
-            </a:r>
-            <a:r>
-              <a:rPr lang="en-US" dirty="0" smtClean="0"/>
-              <a:t>0.5</a:t>
-            </a:r>
-          </a:p>
-          <a:p>
-            <a:r>
-              <a:rPr lang="en-US" dirty="0" smtClean="0"/>
-              <a:t>Trial 3.5 (Beethoven 200 epoch vs Queen 200 epoch)</a:t>
-            </a:r>
-          </a:p>
-          <a:p>
-            <a:r>
-              <a:rPr lang="en-US" dirty="0" smtClean="0"/>
-              <a:t>Trial 4 Adding rhyth</a:t>
-            </a:r>
-            <a:r>
-              <a:rPr lang="en-US" dirty="0" smtClean="0"/>
-              <a:t>m </a:t>
-            </a:r>
-            <a:endParaRPr lang="en-US" dirty="0" smtClean="0"/>
-          </a:p>
-          <a:p>
-            <a:r>
-              <a:rPr lang="en-US" dirty="0" smtClean="0"/>
-              <a:t>Reflection</a:t>
-            </a:r>
-            <a:endParaRPr lang="en-US" dirty="0" smtClean="0"/>
-          </a:p>
-          <a:p>
-            <a:r>
-              <a:rPr lang="en-US" dirty="0" smtClean="0"/>
-              <a:t>Future improvement (rhythm, more instruments, consistent music)</a:t>
-            </a:r>
-          </a:p>
-          <a:p>
-            <a:pPr lvl="1"/>
-            <a:r>
-              <a:rPr lang="en-US" dirty="0" smtClean="0"/>
-              <a:t>Piano can be main or background music</a:t>
-            </a:r>
-          </a:p>
-          <a:p>
-            <a:pPr lvl="1"/>
-            <a:r>
-              <a:rPr lang="en-US" dirty="0" smtClean="0"/>
-              <a:t>Combining all, pop music would not be an issue</a:t>
-            </a:r>
-            <a:endParaRPr lang="en-US" dirty="0"/>
-          </a:p>
-        </p:txBody>
-      </p:sp>
-    </p:spTree>
-    <p:extLst>
-      <p:ext uri="{BB962C8B-B14F-4D97-AF65-F5344CB8AC3E}">
-        <p14:creationId xmlns:p14="http://schemas.microsoft.com/office/powerpoint/2010/main" val="793524326"/>
-      </p:ext>
-    </p:extLst>
-  </p:cSld>
-  <p:clrMapOvr>
-    <a:masterClrMapping/>
-  </p:clrMapOvr>
-  <mc:AlternateContent xmlns:mc="http://schemas.openxmlformats.org/markup-compatibility/2006">
-    <mc:Choice xmlns:p14="http://schemas.microsoft.com/office/powerpoint/2010/main" Requires="p14">
-      <p:transition spd="med" p14:dur="700">
-        <p:fade/>
-      </p:transition>
-    </mc:Choice>
-    <mc:Fallback>
-      <p:transition spd="med">
-        <p:fade/>
-      </p:transition>
-    </mc:Fallback>
-  </mc:AlternateContent>
-  <p:timing>
-    <p:tnLst>
-      <p:par>
-        <p:cTn id="1" dur="indefinite" restart="never" nodeType="tmRoot"/>
-      </p:par>
-    </p:tnLst>
-  </p:timing>
-</p:sld>
-</file>
-
-<file path=ppt/slides/slide25.xml><?xml version="1.0" encoding="utf-8"?>
 <p:sld xmlns:a="http://schemas.openxmlformats.org/drawingml/2006/main" xmlns:r="http://schemas.openxmlformats.org/officeDocument/2006/relationships" xmlns:p="http://schemas.openxmlformats.org/presentationml/2006/main">
   <p:cSld>
     <p:spTree>
@@ -9862,13 +9598,13 @@
   <p:clrMapOvr>
     <a:masterClrMapping/>
   </p:clrMapOvr>
-  <mc:AlternateContent xmlns:mc="http://schemas.openxmlformats.org/markup-compatibility/2006">
-    <mc:Choice xmlns:p14="http://schemas.microsoft.com/office/powerpoint/2010/main" Requires="p14">
+  <mc:AlternateContent xmlns:mc="http://schemas.openxmlformats.org/markup-compatibility/2006" xmlns:p14="http://schemas.microsoft.com/office/powerpoint/2010/main">
+    <mc:Choice Requires="p14">
       <p:transition spd="med" p14:dur="700">
         <p:fade/>
       </p:transition>
     </mc:Choice>
-    <mc:Fallback>
+    <mc:Fallback xmlns="">
       <p:transition spd="med">
         <p:fade/>
       </p:transition>
@@ -9877,7 +9613,7 @@
 </p:sld>
 </file>
 
-<file path=ppt/slides/slide26.xml><?xml version="1.0" encoding="utf-8"?>
+<file path=ppt/slides/slide25.xml><?xml version="1.0" encoding="utf-8"?>
 <p:sld xmlns:a="http://schemas.openxmlformats.org/drawingml/2006/main" xmlns:r="http://schemas.openxmlformats.org/officeDocument/2006/relationships" xmlns:p="http://schemas.openxmlformats.org/presentationml/2006/main">
   <p:cSld>
     <p:spTree>
@@ -10092,13 +9828,13 @@
   <p:clrMapOvr>
     <a:masterClrMapping/>
   </p:clrMapOvr>
-  <mc:AlternateContent xmlns:mc="http://schemas.openxmlformats.org/markup-compatibility/2006">
-    <mc:Choice xmlns:p14="http://schemas.microsoft.com/office/powerpoint/2010/main" Requires="p14">
+  <mc:AlternateContent xmlns:mc="http://schemas.openxmlformats.org/markup-compatibility/2006" xmlns:p14="http://schemas.microsoft.com/office/powerpoint/2010/main">
+    <mc:Choice Requires="p14">
       <p:transition spd="med" p14:dur="700">
         <p:fade/>
       </p:transition>
     </mc:Choice>
-    <mc:Fallback>
+    <mc:Fallback xmlns="">
       <p:transition spd="med">
         <p:fade/>
       </p:transition>
@@ -10107,7 +9843,7 @@
 </p:sld>
 </file>
 
-<file path=ppt/slides/slide27.xml><?xml version="1.0" encoding="utf-8"?>
+<file path=ppt/slides/slide26.xml><?xml version="1.0" encoding="utf-8"?>
 <p:sld xmlns:a="http://schemas.openxmlformats.org/drawingml/2006/main" xmlns:r="http://schemas.openxmlformats.org/officeDocument/2006/relationships" xmlns:p="http://schemas.openxmlformats.org/presentationml/2006/main">
   <p:cSld>
     <p:bg>
@@ -10137,10 +9873,10 @@
           <p:cNvPr id="12" name="Rectangle 11">
             <a:extLst>
               <a:ext uri="{FF2B5EF4-FFF2-40B4-BE49-F238E27FC236}">
-                <a16:creationId xmlns:a16="http://schemas.microsoft.com/office/drawing/2014/main" xmlns="" id="{9203ABB4-7E2A-4248-9FE7-4A419AFF2F17}"/>
+                <a16:creationId xmlns="" xmlns:a16="http://schemas.microsoft.com/office/drawing/2014/main" id="{9203ABB4-7E2A-4248-9FE7-4A419AFF2F17}"/>
               </a:ext>
               <a:ext uri="{C183D7F6-B498-43B3-948B-1728B52AA6E4}">
-                <adec:decorative xmlns:adec="http://schemas.microsoft.com/office/drawing/2017/decorative" xmlns="" val="1"/>
+                <adec:decorative xmlns="" xmlns:adec="http://schemas.microsoft.com/office/drawing/2017/decorative" val="1"/>
               </a:ext>
             </a:extLst>
           </p:cNvPr>
@@ -10150,7 +9886,7 @@
           <p:nvPr>
             <p:extLst>
               <p:ext uri="{386F3935-93C4-4BCD-93E2-E3B085C9AB24}">
-                <p16:designElem xmlns:p16="http://schemas.microsoft.com/office/powerpoint/2015/main" xmlns="" val="1"/>
+                <p16:designElem xmlns="" xmlns:p16="http://schemas.microsoft.com/office/powerpoint/2015/main" val="1"/>
               </p:ext>
             </p:extLst>
           </p:nvPr>
@@ -10197,10 +9933,10 @@
           <p:cNvPr id="14" name="Rectangle 13">
             <a:extLst>
               <a:ext uri="{FF2B5EF4-FFF2-40B4-BE49-F238E27FC236}">
-                <a16:creationId xmlns:a16="http://schemas.microsoft.com/office/drawing/2014/main" xmlns="" id="{3126970D-C1E5-4FB1-84E8-86CB9CED1C80}"/>
+                <a16:creationId xmlns="" xmlns:a16="http://schemas.microsoft.com/office/drawing/2014/main" id="{3126970D-C1E5-4FB1-84E8-86CB9CED1C80}"/>
               </a:ext>
               <a:ext uri="{C183D7F6-B498-43B3-948B-1728B52AA6E4}">
-                <adec:decorative xmlns:adec="http://schemas.microsoft.com/office/drawing/2017/decorative" xmlns="" val="1"/>
+                <adec:decorative xmlns="" xmlns:adec="http://schemas.microsoft.com/office/drawing/2017/decorative" val="1"/>
               </a:ext>
             </a:extLst>
           </p:cNvPr>
@@ -10210,7 +9946,7 @@
           <p:nvPr>
             <p:extLst>
               <p:ext uri="{386F3935-93C4-4BCD-93E2-E3B085C9AB24}">
-                <p16:designElem xmlns:p16="http://schemas.microsoft.com/office/powerpoint/2015/main" xmlns="" val="1"/>
+                <p16:designElem xmlns="" xmlns:p16="http://schemas.microsoft.com/office/powerpoint/2015/main" val="1"/>
               </p:ext>
             </p:extLst>
           </p:nvPr>
@@ -10252,7 +9988,7 @@
           <p:cNvPr id="7" name="Subtitle 2">
             <a:extLst>
               <a:ext uri="{FF2B5EF4-FFF2-40B4-BE49-F238E27FC236}">
-                <a16:creationId xmlns:a16="http://schemas.microsoft.com/office/drawing/2014/main" xmlns="" id="{816F833A-AE27-46D2-AFAE-00251F2B16E7}"/>
+                <a16:creationId xmlns="" xmlns:a16="http://schemas.microsoft.com/office/drawing/2014/main" id="{816F833A-AE27-46D2-AFAE-00251F2B16E7}"/>
               </a:ext>
             </a:extLst>
           </p:cNvPr>
@@ -10552,7 +10288,7 @@
           <p:cNvPr id="3" name="Subtitle 2">
             <a:extLst>
               <a:ext uri="{FF2B5EF4-FFF2-40B4-BE49-F238E27FC236}">
-                <a16:creationId xmlns:a16="http://schemas.microsoft.com/office/drawing/2014/main" xmlns="" id="{39E6B6BE-9679-4F0C-8ED6-A4BD5C363054}"/>
+                <a16:creationId xmlns="" xmlns:a16="http://schemas.microsoft.com/office/drawing/2014/main" id="{39E6B6BE-9679-4F0C-8ED6-A4BD5C363054}"/>
               </a:ext>
             </a:extLst>
           </p:cNvPr>
@@ -10613,7 +10349,7 @@
           <p:cNvPr id="5" name="Picture 4">
             <a:extLst>
               <a:ext uri="{FF2B5EF4-FFF2-40B4-BE49-F238E27FC236}">
-                <a16:creationId xmlns:a16="http://schemas.microsoft.com/office/drawing/2014/main" xmlns="" id="{B8927729-D7CA-456A-A63F-938311DAF36C}"/>
+                <a16:creationId xmlns="" xmlns:a16="http://schemas.microsoft.com/office/drawing/2014/main" id="{B8927729-D7CA-456A-A63F-938311DAF36C}"/>
               </a:ext>
             </a:extLst>
           </p:cNvPr>
@@ -10686,13 +10422,13 @@
   <p:clrMapOvr>
     <a:masterClrMapping/>
   </p:clrMapOvr>
-  <mc:AlternateContent xmlns:mc="http://schemas.openxmlformats.org/markup-compatibility/2006">
-    <mc:Choice xmlns:p14="http://schemas.microsoft.com/office/powerpoint/2010/main" Requires="p14">
+  <mc:AlternateContent xmlns:mc="http://schemas.openxmlformats.org/markup-compatibility/2006" xmlns:p14="http://schemas.microsoft.com/office/powerpoint/2010/main">
+    <mc:Choice Requires="p14">
       <p:transition spd="med" p14:dur="700">
         <p:fade/>
       </p:transition>
     </mc:Choice>
-    <mc:Fallback>
+    <mc:Fallback xmlns="">
       <p:transition spd="med">
         <p:fade/>
       </p:transition>
@@ -10738,10 +10474,10 @@
           <p:cNvPr id="19" name="Rectangle 18">
             <a:extLst>
               <a:ext uri="{FF2B5EF4-FFF2-40B4-BE49-F238E27FC236}">
-                <a16:creationId xmlns:a16="http://schemas.microsoft.com/office/drawing/2014/main" xmlns="" id="{57F231E5-F402-49E1-82B4-C762909ED227}"/>
+                <a16:creationId xmlns="" xmlns:a16="http://schemas.microsoft.com/office/drawing/2014/main" id="{57F231E5-F402-49E1-82B4-C762909ED227}"/>
               </a:ext>
               <a:ext uri="{C183D7F6-B498-43B3-948B-1728B52AA6E4}">
-                <adec:decorative xmlns:adec="http://schemas.microsoft.com/office/drawing/2017/decorative" xmlns="" val="1"/>
+                <adec:decorative xmlns="" xmlns:adec="http://schemas.microsoft.com/office/drawing/2017/decorative" val="1"/>
               </a:ext>
             </a:extLst>
           </p:cNvPr>
@@ -10751,7 +10487,7 @@
           <p:nvPr>
             <p:extLst>
               <p:ext uri="{386F3935-93C4-4BCD-93E2-E3B085C9AB24}">
-                <p16:designElem xmlns:p16="http://schemas.microsoft.com/office/powerpoint/2015/main" xmlns="" val="1"/>
+                <p16:designElem xmlns="" xmlns:p16="http://schemas.microsoft.com/office/powerpoint/2015/main" val="1"/>
               </p:ext>
             </p:extLst>
           </p:nvPr>
@@ -10798,10 +10534,10 @@
           <p:cNvPr id="21" name="Freeform: Shape 20">
             <a:extLst>
               <a:ext uri="{FF2B5EF4-FFF2-40B4-BE49-F238E27FC236}">
-                <a16:creationId xmlns:a16="http://schemas.microsoft.com/office/drawing/2014/main" xmlns="" id="{6F0BA12B-74D1-4DB1-9A3F-C9BA27B81512}"/>
+                <a16:creationId xmlns="" xmlns:a16="http://schemas.microsoft.com/office/drawing/2014/main" id="{6F0BA12B-74D1-4DB1-9A3F-C9BA27B81512}"/>
               </a:ext>
               <a:ext uri="{C183D7F6-B498-43B3-948B-1728B52AA6E4}">
-                <adec:decorative xmlns:adec="http://schemas.microsoft.com/office/drawing/2017/decorative" xmlns="" val="1"/>
+                <adec:decorative xmlns="" xmlns:adec="http://schemas.microsoft.com/office/drawing/2017/decorative" val="1"/>
               </a:ext>
             </a:extLst>
           </p:cNvPr>
@@ -10811,7 +10547,7 @@
           <p:nvPr>
             <p:extLst>
               <p:ext uri="{386F3935-93C4-4BCD-93E2-E3B085C9AB24}">
-                <p16:designElem xmlns:p16="http://schemas.microsoft.com/office/powerpoint/2015/main" xmlns="" val="1"/>
+                <p16:designElem xmlns="" xmlns:p16="http://schemas.microsoft.com/office/powerpoint/2015/main" val="1"/>
               </p:ext>
             </p:extLst>
           </p:nvPr>
@@ -10896,10 +10632,10 @@
           <p:cNvPr id="23" name="Freeform: Shape 22">
             <a:extLst>
               <a:ext uri="{FF2B5EF4-FFF2-40B4-BE49-F238E27FC236}">
-                <a16:creationId xmlns:a16="http://schemas.microsoft.com/office/drawing/2014/main" xmlns="" id="{515FCC40-AA93-4D3B-90D0-69BC824EAD47}"/>
+                <a16:creationId xmlns="" xmlns:a16="http://schemas.microsoft.com/office/drawing/2014/main" id="{515FCC40-AA93-4D3B-90D0-69BC824EAD47}"/>
               </a:ext>
               <a:ext uri="{C183D7F6-B498-43B3-948B-1728B52AA6E4}">
-                <adec:decorative xmlns:adec="http://schemas.microsoft.com/office/drawing/2017/decorative" xmlns="" val="1"/>
+                <adec:decorative xmlns="" xmlns:adec="http://schemas.microsoft.com/office/drawing/2017/decorative" val="1"/>
               </a:ext>
             </a:extLst>
           </p:cNvPr>
@@ -10909,7 +10645,7 @@
           <p:nvPr>
             <p:extLst>
               <p:ext uri="{386F3935-93C4-4BCD-93E2-E3B085C9AB24}">
-                <p16:designElem xmlns:p16="http://schemas.microsoft.com/office/powerpoint/2015/main" xmlns="" val="1"/>
+                <p16:designElem xmlns="" xmlns:p16="http://schemas.microsoft.com/office/powerpoint/2015/main" val="1"/>
               </p:ext>
             </p:extLst>
           </p:nvPr>
@@ -10986,7 +10722,7 @@
           <p:cNvPr id="7" name="Subtitle 2">
             <a:extLst>
               <a:ext uri="{FF2B5EF4-FFF2-40B4-BE49-F238E27FC236}">
-                <a16:creationId xmlns:a16="http://schemas.microsoft.com/office/drawing/2014/main" xmlns="" id="{816F833A-AE27-46D2-AFAE-00251F2B16E7}"/>
+                <a16:creationId xmlns="" xmlns:a16="http://schemas.microsoft.com/office/drawing/2014/main" id="{816F833A-AE27-46D2-AFAE-00251F2B16E7}"/>
               </a:ext>
             </a:extLst>
           </p:cNvPr>
@@ -11278,7 +11014,7 @@
           <p:cNvPr id="3" name="Subtitle 2">
             <a:extLst>
               <a:ext uri="{FF2B5EF4-FFF2-40B4-BE49-F238E27FC236}">
-                <a16:creationId xmlns:a16="http://schemas.microsoft.com/office/drawing/2014/main" xmlns="" id="{39E6B6BE-9679-4F0C-8ED6-A4BD5C363054}"/>
+                <a16:creationId xmlns="" xmlns:a16="http://schemas.microsoft.com/office/drawing/2014/main" id="{39E6B6BE-9679-4F0C-8ED6-A4BD5C363054}"/>
               </a:ext>
             </a:extLst>
           </p:cNvPr>
@@ -11403,13 +11139,13 @@
   <p:clrMapOvr>
     <a:masterClrMapping/>
   </p:clrMapOvr>
-  <mc:AlternateContent xmlns:mc="http://schemas.openxmlformats.org/markup-compatibility/2006">
-    <mc:Choice xmlns:p14="http://schemas.microsoft.com/office/powerpoint/2010/main" Requires="p14">
+  <mc:AlternateContent xmlns:mc="http://schemas.openxmlformats.org/markup-compatibility/2006" xmlns:p14="http://schemas.microsoft.com/office/powerpoint/2010/main">
+    <mc:Choice Requires="p14">
       <p:transition spd="med" p14:dur="700">
         <p:fade/>
       </p:transition>
     </mc:Choice>
-    <mc:Fallback>
+    <mc:Fallback xmlns="">
       <p:transition spd="med">
         <p:fade/>
       </p:transition>
@@ -11596,13 +11332,13 @@
   <p:clrMapOvr>
     <a:masterClrMapping/>
   </p:clrMapOvr>
-  <mc:AlternateContent xmlns:mc="http://schemas.openxmlformats.org/markup-compatibility/2006">
-    <mc:Choice xmlns:p14="http://schemas.microsoft.com/office/powerpoint/2010/main" Requires="p14">
+  <mc:AlternateContent xmlns:mc="http://schemas.openxmlformats.org/markup-compatibility/2006" xmlns:p14="http://schemas.microsoft.com/office/powerpoint/2010/main">
+    <mc:Choice Requires="p14">
       <p:transition spd="med" p14:dur="700">
         <p:fade/>
       </p:transition>
     </mc:Choice>
-    <mc:Fallback>
+    <mc:Fallback xmlns="">
       <p:transition spd="med">
         <p:fade/>
       </p:transition>
@@ -11648,10 +11384,10 @@
           <p:cNvPr id="12" name="Rectangle 11">
             <a:extLst>
               <a:ext uri="{FF2B5EF4-FFF2-40B4-BE49-F238E27FC236}">
-                <a16:creationId xmlns:a16="http://schemas.microsoft.com/office/drawing/2014/main" xmlns="" id="{9203ABB4-7E2A-4248-9FE7-4A419AFF2F17}"/>
+                <a16:creationId xmlns="" xmlns:a16="http://schemas.microsoft.com/office/drawing/2014/main" id="{9203ABB4-7E2A-4248-9FE7-4A419AFF2F17}"/>
               </a:ext>
               <a:ext uri="{C183D7F6-B498-43B3-948B-1728B52AA6E4}">
-                <adec:decorative xmlns:adec="http://schemas.microsoft.com/office/drawing/2017/decorative" xmlns="" val="1"/>
+                <adec:decorative xmlns="" xmlns:adec="http://schemas.microsoft.com/office/drawing/2017/decorative" val="1"/>
               </a:ext>
             </a:extLst>
           </p:cNvPr>
@@ -11661,7 +11397,7 @@
           <p:nvPr>
             <p:extLst>
               <p:ext uri="{386F3935-93C4-4BCD-93E2-E3B085C9AB24}">
-                <p16:designElem xmlns:p16="http://schemas.microsoft.com/office/powerpoint/2015/main" xmlns="" val="1"/>
+                <p16:designElem xmlns="" xmlns:p16="http://schemas.microsoft.com/office/powerpoint/2015/main" val="1"/>
               </p:ext>
             </p:extLst>
           </p:nvPr>
@@ -11708,10 +11444,10 @@
           <p:cNvPr id="14" name="Rectangle 13">
             <a:extLst>
               <a:ext uri="{FF2B5EF4-FFF2-40B4-BE49-F238E27FC236}">
-                <a16:creationId xmlns:a16="http://schemas.microsoft.com/office/drawing/2014/main" xmlns="" id="{3126970D-C1E5-4FB1-84E8-86CB9CED1C80}"/>
+                <a16:creationId xmlns="" xmlns:a16="http://schemas.microsoft.com/office/drawing/2014/main" id="{3126970D-C1E5-4FB1-84E8-86CB9CED1C80}"/>
               </a:ext>
               <a:ext uri="{C183D7F6-B498-43B3-948B-1728B52AA6E4}">
-                <adec:decorative xmlns:adec="http://schemas.microsoft.com/office/drawing/2017/decorative" xmlns="" val="1"/>
+                <adec:decorative xmlns="" xmlns:adec="http://schemas.microsoft.com/office/drawing/2017/decorative" val="1"/>
               </a:ext>
             </a:extLst>
           </p:cNvPr>
@@ -11721,7 +11457,7 @@
           <p:nvPr>
             <p:extLst>
               <p:ext uri="{386F3935-93C4-4BCD-93E2-E3B085C9AB24}">
-                <p16:designElem xmlns:p16="http://schemas.microsoft.com/office/powerpoint/2015/main" xmlns="" val="1"/>
+                <p16:designElem xmlns="" xmlns:p16="http://schemas.microsoft.com/office/powerpoint/2015/main" val="1"/>
               </p:ext>
             </p:extLst>
           </p:nvPr>
@@ -11763,7 +11499,7 @@
           <p:cNvPr id="7" name="Subtitle 2">
             <a:extLst>
               <a:ext uri="{FF2B5EF4-FFF2-40B4-BE49-F238E27FC236}">
-                <a16:creationId xmlns:a16="http://schemas.microsoft.com/office/drawing/2014/main" xmlns="" id="{816F833A-AE27-46D2-AFAE-00251F2B16E7}"/>
+                <a16:creationId xmlns="" xmlns:a16="http://schemas.microsoft.com/office/drawing/2014/main" id="{816F833A-AE27-46D2-AFAE-00251F2B16E7}"/>
               </a:ext>
             </a:extLst>
           </p:cNvPr>
@@ -12055,7 +11791,7 @@
           <p:cNvPr id="3" name="Subtitle 2">
             <a:extLst>
               <a:ext uri="{FF2B5EF4-FFF2-40B4-BE49-F238E27FC236}">
-                <a16:creationId xmlns:a16="http://schemas.microsoft.com/office/drawing/2014/main" xmlns="" id="{39E6B6BE-9679-4F0C-8ED6-A4BD5C363054}"/>
+                <a16:creationId xmlns="" xmlns:a16="http://schemas.microsoft.com/office/drawing/2014/main" id="{39E6B6BE-9679-4F0C-8ED6-A4BD5C363054}"/>
               </a:ext>
             </a:extLst>
           </p:cNvPr>
@@ -12106,7 +11842,7 @@
           <p:cNvPr id="6" name="Picture 5">
             <a:extLst>
               <a:ext uri="{FF2B5EF4-FFF2-40B4-BE49-F238E27FC236}">
-                <a16:creationId xmlns:a16="http://schemas.microsoft.com/office/drawing/2014/main" xmlns="" id="{94C35654-8739-4986-9340-4B8D4D049BB1}"/>
+                <a16:creationId xmlns="" xmlns:a16="http://schemas.microsoft.com/office/drawing/2014/main" id="{94C35654-8739-4986-9340-4B8D4D049BB1}"/>
               </a:ext>
             </a:extLst>
           </p:cNvPr>
@@ -12161,11 +11897,6 @@
               </a:rPr>
               <a:t>Data</a:t>
             </a:r>
-            <a:endParaRPr lang="en-US" dirty="0">
-              <a:solidFill>
-                <a:srgbClr val="40BAD2"/>
-              </a:solidFill>
-            </a:endParaRPr>
           </a:p>
         </p:txBody>
       </p:sp>
@@ -12179,13 +11910,13 @@
   <p:clrMapOvr>
     <a:masterClrMapping/>
   </p:clrMapOvr>
-  <mc:AlternateContent xmlns:mc="http://schemas.openxmlformats.org/markup-compatibility/2006">
-    <mc:Choice xmlns:p14="http://schemas.microsoft.com/office/powerpoint/2010/main" Requires="p14">
+  <mc:AlternateContent xmlns:mc="http://schemas.openxmlformats.org/markup-compatibility/2006" xmlns:p14="http://schemas.microsoft.com/office/powerpoint/2010/main">
+    <mc:Choice Requires="p14">
       <p:transition spd="med" p14:dur="700">
         <p:fade/>
       </p:transition>
     </mc:Choice>
-    <mc:Fallback>
+    <mc:Fallback xmlns="">
       <p:transition spd="med">
         <p:fade/>
       </p:transition>
@@ -12223,10 +11954,10 @@
           <p:cNvPr id="12" name="Rectangle 11">
             <a:extLst>
               <a:ext uri="{FF2B5EF4-FFF2-40B4-BE49-F238E27FC236}">
-                <a16:creationId xmlns:a16="http://schemas.microsoft.com/office/drawing/2014/main" xmlns="" id="{9203ABB4-7E2A-4248-9FE7-4A419AFF2F17}"/>
+                <a16:creationId xmlns="" xmlns:a16="http://schemas.microsoft.com/office/drawing/2014/main" id="{9203ABB4-7E2A-4248-9FE7-4A419AFF2F17}"/>
               </a:ext>
               <a:ext uri="{C183D7F6-B498-43B3-948B-1728B52AA6E4}">
-                <adec:decorative xmlns:adec="http://schemas.microsoft.com/office/drawing/2017/decorative" xmlns="" val="1"/>
+                <adec:decorative xmlns="" xmlns:adec="http://schemas.microsoft.com/office/drawing/2017/decorative" val="1"/>
               </a:ext>
             </a:extLst>
           </p:cNvPr>
@@ -12236,7 +11967,7 @@
           <p:nvPr>
             <p:extLst>
               <p:ext uri="{386F3935-93C4-4BCD-93E2-E3B085C9AB24}">
-                <p16:designElem xmlns:p16="http://schemas.microsoft.com/office/powerpoint/2015/main" xmlns="" val="1"/>
+                <p16:designElem xmlns="" xmlns:p16="http://schemas.microsoft.com/office/powerpoint/2015/main" val="1"/>
               </p:ext>
             </p:extLst>
           </p:nvPr>
@@ -12283,10 +12014,10 @@
           <p:cNvPr id="14" name="Rectangle 13">
             <a:extLst>
               <a:ext uri="{FF2B5EF4-FFF2-40B4-BE49-F238E27FC236}">
-                <a16:creationId xmlns:a16="http://schemas.microsoft.com/office/drawing/2014/main" xmlns="" id="{3126970D-C1E5-4FB1-84E8-86CB9CED1C80}"/>
+                <a16:creationId xmlns="" xmlns:a16="http://schemas.microsoft.com/office/drawing/2014/main" id="{3126970D-C1E5-4FB1-84E8-86CB9CED1C80}"/>
               </a:ext>
               <a:ext uri="{C183D7F6-B498-43B3-948B-1728B52AA6E4}">
-                <adec:decorative xmlns:adec="http://schemas.microsoft.com/office/drawing/2017/decorative" xmlns="" val="1"/>
+                <adec:decorative xmlns="" xmlns:adec="http://schemas.microsoft.com/office/drawing/2017/decorative" val="1"/>
               </a:ext>
             </a:extLst>
           </p:cNvPr>
@@ -12296,7 +12027,7 @@
           <p:nvPr>
             <p:extLst>
               <p:ext uri="{386F3935-93C4-4BCD-93E2-E3B085C9AB24}">
-                <p16:designElem xmlns:p16="http://schemas.microsoft.com/office/powerpoint/2015/main" xmlns="" val="1"/>
+                <p16:designElem xmlns="" xmlns:p16="http://schemas.microsoft.com/office/powerpoint/2015/main" val="1"/>
               </p:ext>
             </p:extLst>
           </p:nvPr>
@@ -12338,7 +12069,7 @@
           <p:cNvPr id="7" name="Subtitle 2">
             <a:extLst>
               <a:ext uri="{FF2B5EF4-FFF2-40B4-BE49-F238E27FC236}">
-                <a16:creationId xmlns:a16="http://schemas.microsoft.com/office/drawing/2014/main" xmlns="" id="{816F833A-AE27-46D2-AFAE-00251F2B16E7}"/>
+                <a16:creationId xmlns="" xmlns:a16="http://schemas.microsoft.com/office/drawing/2014/main" id="{816F833A-AE27-46D2-AFAE-00251F2B16E7}"/>
               </a:ext>
             </a:extLst>
           </p:cNvPr>
@@ -12660,7 +12391,7 @@
           <p:cNvPr id="3" name="Subtitle 2">
             <a:extLst>
               <a:ext uri="{FF2B5EF4-FFF2-40B4-BE49-F238E27FC236}">
-                <a16:creationId xmlns:a16="http://schemas.microsoft.com/office/drawing/2014/main" xmlns="" id="{39E6B6BE-9679-4F0C-8ED6-A4BD5C363054}"/>
+                <a16:creationId xmlns="" xmlns:a16="http://schemas.microsoft.com/office/drawing/2014/main" id="{39E6B6BE-9679-4F0C-8ED6-A4BD5C363054}"/>
               </a:ext>
             </a:extLst>
           </p:cNvPr>
@@ -12796,13 +12527,13 @@
   <p:clrMapOvr>
     <a:masterClrMapping/>
   </p:clrMapOvr>
-  <mc:AlternateContent xmlns:mc="http://schemas.openxmlformats.org/markup-compatibility/2006">
-    <mc:Choice xmlns:p14="http://schemas.microsoft.com/office/powerpoint/2010/main" Requires="p14">
+  <mc:AlternateContent xmlns:mc="http://schemas.openxmlformats.org/markup-compatibility/2006" xmlns:p14="http://schemas.microsoft.com/office/powerpoint/2010/main">
+    <mc:Choice Requires="p14">
       <p:transition spd="med" p14:dur="700">
         <p:fade/>
       </p:transition>
     </mc:Choice>
-    <mc:Fallback>
+    <mc:Fallback xmlns="">
       <p:transition spd="med">
         <p:fade/>
       </p:transition>
@@ -12989,13 +12720,13 @@
   <p:clrMapOvr>
     <a:masterClrMapping/>
   </p:clrMapOvr>
-  <mc:AlternateContent xmlns:mc="http://schemas.openxmlformats.org/markup-compatibility/2006">
-    <mc:Choice xmlns:p14="http://schemas.microsoft.com/office/powerpoint/2010/main" Requires="p14">
+  <mc:AlternateContent xmlns:mc="http://schemas.openxmlformats.org/markup-compatibility/2006" xmlns:p14="http://schemas.microsoft.com/office/powerpoint/2010/main">
+    <mc:Choice Requires="p14">
       <p:transition spd="med" p14:dur="700">
         <p:fade/>
       </p:transition>
     </mc:Choice>
-    <mc:Fallback>
+    <mc:Fallback xmlns="">
       <p:transition spd="med">
         <p:fade/>
       </p:transition>
@@ -13214,13 +12945,13 @@
   <p:clrMapOvr>
     <a:masterClrMapping/>
   </p:clrMapOvr>
-  <mc:AlternateContent xmlns:mc="http://schemas.openxmlformats.org/markup-compatibility/2006">
-    <mc:Choice xmlns:p14="http://schemas.microsoft.com/office/powerpoint/2010/main" Requires="p14">
+  <mc:AlternateContent xmlns:mc="http://schemas.openxmlformats.org/markup-compatibility/2006" xmlns:p14="http://schemas.microsoft.com/office/powerpoint/2010/main">
+    <mc:Choice Requires="p14">
       <p:transition spd="med" p14:dur="700">
         <p:fade/>
       </p:transition>
     </mc:Choice>
-    <mc:Fallback>
+    <mc:Fallback xmlns="">
       <p:transition spd="med">
         <p:fade/>
       </p:transition>
@@ -13266,10 +12997,10 @@
           <p:cNvPr id="12" name="Rectangle 11">
             <a:extLst>
               <a:ext uri="{FF2B5EF4-FFF2-40B4-BE49-F238E27FC236}">
-                <a16:creationId xmlns:a16="http://schemas.microsoft.com/office/drawing/2014/main" xmlns="" id="{9203ABB4-7E2A-4248-9FE7-4A419AFF2F17}"/>
+                <a16:creationId xmlns="" xmlns:a16="http://schemas.microsoft.com/office/drawing/2014/main" id="{9203ABB4-7E2A-4248-9FE7-4A419AFF2F17}"/>
               </a:ext>
               <a:ext uri="{C183D7F6-B498-43B3-948B-1728B52AA6E4}">
-                <adec:decorative xmlns:adec="http://schemas.microsoft.com/office/drawing/2017/decorative" xmlns="" val="1"/>
+                <adec:decorative xmlns="" xmlns:adec="http://schemas.microsoft.com/office/drawing/2017/decorative" val="1"/>
               </a:ext>
             </a:extLst>
           </p:cNvPr>
@@ -13279,7 +13010,7 @@
           <p:nvPr>
             <p:extLst>
               <p:ext uri="{386F3935-93C4-4BCD-93E2-E3B085C9AB24}">
-                <p16:designElem xmlns:p16="http://schemas.microsoft.com/office/powerpoint/2015/main" xmlns="" val="1"/>
+                <p16:designElem xmlns="" xmlns:p16="http://schemas.microsoft.com/office/powerpoint/2015/main" val="1"/>
               </p:ext>
             </p:extLst>
           </p:nvPr>
@@ -13326,10 +13057,10 @@
           <p:cNvPr id="14" name="Rectangle 13">
             <a:extLst>
               <a:ext uri="{FF2B5EF4-FFF2-40B4-BE49-F238E27FC236}">
-                <a16:creationId xmlns:a16="http://schemas.microsoft.com/office/drawing/2014/main" xmlns="" id="{3126970D-C1E5-4FB1-84E8-86CB9CED1C80}"/>
+                <a16:creationId xmlns="" xmlns:a16="http://schemas.microsoft.com/office/drawing/2014/main" id="{3126970D-C1E5-4FB1-84E8-86CB9CED1C80}"/>
               </a:ext>
               <a:ext uri="{C183D7F6-B498-43B3-948B-1728B52AA6E4}">
-                <adec:decorative xmlns:adec="http://schemas.microsoft.com/office/drawing/2017/decorative" xmlns="" val="1"/>
+                <adec:decorative xmlns="" xmlns:adec="http://schemas.microsoft.com/office/drawing/2017/decorative" val="1"/>
               </a:ext>
             </a:extLst>
           </p:cNvPr>
@@ -13339,7 +13070,7 @@
           <p:nvPr>
             <p:extLst>
               <p:ext uri="{386F3935-93C4-4BCD-93E2-E3B085C9AB24}">
-                <p16:designElem xmlns:p16="http://schemas.microsoft.com/office/powerpoint/2015/main" xmlns="" val="1"/>
+                <p16:designElem xmlns="" xmlns:p16="http://schemas.microsoft.com/office/powerpoint/2015/main" val="1"/>
               </p:ext>
             </p:extLst>
           </p:nvPr>
@@ -13381,7 +13112,7 @@
           <p:cNvPr id="7" name="Subtitle 2">
             <a:extLst>
               <a:ext uri="{FF2B5EF4-FFF2-40B4-BE49-F238E27FC236}">
-                <a16:creationId xmlns:a16="http://schemas.microsoft.com/office/drawing/2014/main" xmlns="" id="{816F833A-AE27-46D2-AFAE-00251F2B16E7}"/>
+                <a16:creationId xmlns="" xmlns:a16="http://schemas.microsoft.com/office/drawing/2014/main" id="{816F833A-AE27-46D2-AFAE-00251F2B16E7}"/>
               </a:ext>
             </a:extLst>
           </p:cNvPr>
@@ -13681,7 +13412,7 @@
           <p:cNvPr id="3" name="Subtitle 2">
             <a:extLst>
               <a:ext uri="{FF2B5EF4-FFF2-40B4-BE49-F238E27FC236}">
-                <a16:creationId xmlns:a16="http://schemas.microsoft.com/office/drawing/2014/main" xmlns="" id="{39E6B6BE-9679-4F0C-8ED6-A4BD5C363054}"/>
+                <a16:creationId xmlns="" xmlns:a16="http://schemas.microsoft.com/office/drawing/2014/main" id="{39E6B6BE-9679-4F0C-8ED6-A4BD5C363054}"/>
               </a:ext>
             </a:extLst>
           </p:cNvPr>
@@ -13729,7 +13460,7 @@
           <p:cNvPr id="2" name="Picture 1">
             <a:extLst>
               <a:ext uri="{FF2B5EF4-FFF2-40B4-BE49-F238E27FC236}">
-                <a16:creationId xmlns:a16="http://schemas.microsoft.com/office/drawing/2014/main" xmlns="" id="{1210EAA8-9BB3-4FB6-A692-844C3491709A}"/>
+                <a16:creationId xmlns="" xmlns:a16="http://schemas.microsoft.com/office/drawing/2014/main" id="{1210EAA8-9BB3-4FB6-A692-844C3491709A}"/>
               </a:ext>
             </a:extLst>
           </p:cNvPr>
@@ -13797,13 +13528,13 @@
   <p:clrMapOvr>
     <a:masterClrMapping/>
   </p:clrMapOvr>
-  <mc:AlternateContent xmlns:mc="http://schemas.openxmlformats.org/markup-compatibility/2006">
-    <mc:Choice xmlns:p14="http://schemas.microsoft.com/office/powerpoint/2010/main" Requires="p14">
+  <mc:AlternateContent xmlns:mc="http://schemas.openxmlformats.org/markup-compatibility/2006" xmlns:p14="http://schemas.microsoft.com/office/powerpoint/2010/main">
+    <mc:Choice Requires="p14">
       <p:transition spd="med" p14:dur="700">
         <p:fade/>
       </p:transition>
     </mc:Choice>
-    <mc:Fallback>
+    <mc:Fallback xmlns="">
       <p:transition spd="med">
         <p:fade/>
       </p:transition>

</xml_diff>